<commit_message>
updated pic for good vis
</commit_message>
<xml_diff>
--- a/Module_12/powerpoint.pptx
+++ b/Module_12/powerpoint.pptx
@@ -199,7 +199,7 @@
           <a:p>
             <a:fld id="{67F50315-23FB-744C-A442-688C0CD35FC4}" type="datetimeFigureOut">
               <a:rPr lang="en-US" smtClean="0"/>
-              <a:t>4/20/17</a:t>
+              <a:t>4/24/17</a:t>
             </a:fld>
             <a:endParaRPr lang="en-US"/>
           </a:p>
@@ -682,7 +682,7 @@
           <a:p>
             <a:fld id="{C2914099-B2CB-0C48-8BCE-5C316BE25F0F}" type="datetimeFigureOut">
               <a:rPr lang="en-US" smtClean="0"/>
-              <a:t>4/20/17</a:t>
+              <a:t>4/24/17</a:t>
             </a:fld>
             <a:endParaRPr lang="en-US"/>
           </a:p>
@@ -852,7 +852,7 @@
           <a:p>
             <a:fld id="{C2914099-B2CB-0C48-8BCE-5C316BE25F0F}" type="datetimeFigureOut">
               <a:rPr lang="en-US" smtClean="0"/>
-              <a:t>4/20/17</a:t>
+              <a:t>4/24/17</a:t>
             </a:fld>
             <a:endParaRPr lang="en-US"/>
           </a:p>
@@ -1032,7 +1032,7 @@
           <a:p>
             <a:fld id="{C2914099-B2CB-0C48-8BCE-5C316BE25F0F}" type="datetimeFigureOut">
               <a:rPr lang="en-US" smtClean="0"/>
-              <a:t>4/20/17</a:t>
+              <a:t>4/24/17</a:t>
             </a:fld>
             <a:endParaRPr lang="en-US"/>
           </a:p>
@@ -1202,7 +1202,7 @@
           <a:p>
             <a:fld id="{C2914099-B2CB-0C48-8BCE-5C316BE25F0F}" type="datetimeFigureOut">
               <a:rPr lang="en-US" smtClean="0"/>
-              <a:t>4/20/17</a:t>
+              <a:t>4/24/17</a:t>
             </a:fld>
             <a:endParaRPr lang="en-US"/>
           </a:p>
@@ -1448,7 +1448,7 @@
           <a:p>
             <a:fld id="{C2914099-B2CB-0C48-8BCE-5C316BE25F0F}" type="datetimeFigureOut">
               <a:rPr lang="en-US" smtClean="0"/>
-              <a:t>4/20/17</a:t>
+              <a:t>4/24/17</a:t>
             </a:fld>
             <a:endParaRPr lang="en-US"/>
           </a:p>
@@ -1680,7 +1680,7 @@
           <a:p>
             <a:fld id="{C2914099-B2CB-0C48-8BCE-5C316BE25F0F}" type="datetimeFigureOut">
               <a:rPr lang="en-US" smtClean="0"/>
-              <a:t>4/20/17</a:t>
+              <a:t>4/24/17</a:t>
             </a:fld>
             <a:endParaRPr lang="en-US"/>
           </a:p>
@@ -2047,7 +2047,7 @@
           <a:p>
             <a:fld id="{C2914099-B2CB-0C48-8BCE-5C316BE25F0F}" type="datetimeFigureOut">
               <a:rPr lang="en-US" smtClean="0"/>
-              <a:t>4/20/17</a:t>
+              <a:t>4/24/17</a:t>
             </a:fld>
             <a:endParaRPr lang="en-US"/>
           </a:p>
@@ -2165,7 +2165,7 @@
           <a:p>
             <a:fld id="{C2914099-B2CB-0C48-8BCE-5C316BE25F0F}" type="datetimeFigureOut">
               <a:rPr lang="en-US" smtClean="0"/>
-              <a:t>4/20/17</a:t>
+              <a:t>4/24/17</a:t>
             </a:fld>
             <a:endParaRPr lang="en-US"/>
           </a:p>
@@ -2260,7 +2260,7 @@
           <a:p>
             <a:fld id="{C2914099-B2CB-0C48-8BCE-5C316BE25F0F}" type="datetimeFigureOut">
               <a:rPr lang="en-US" smtClean="0"/>
-              <a:t>4/20/17</a:t>
+              <a:t>4/24/17</a:t>
             </a:fld>
             <a:endParaRPr lang="en-US"/>
           </a:p>
@@ -2537,7 +2537,7 @@
           <a:p>
             <a:fld id="{C2914099-B2CB-0C48-8BCE-5C316BE25F0F}" type="datetimeFigureOut">
               <a:rPr lang="en-US" smtClean="0"/>
-              <a:t>4/20/17</a:t>
+              <a:t>4/24/17</a:t>
             </a:fld>
             <a:endParaRPr lang="en-US"/>
           </a:p>
@@ -2790,7 +2790,7 @@
           <a:p>
             <a:fld id="{C2914099-B2CB-0C48-8BCE-5C316BE25F0F}" type="datetimeFigureOut">
               <a:rPr lang="en-US" smtClean="0"/>
-              <a:t>4/20/17</a:t>
+              <a:t>4/24/17</a:t>
             </a:fld>
             <a:endParaRPr lang="en-US"/>
           </a:p>
@@ -3003,7 +3003,7 @@
           <a:p>
             <a:fld id="{C2914099-B2CB-0C48-8BCE-5C316BE25F0F}" type="datetimeFigureOut">
               <a:rPr lang="en-US" smtClean="0"/>
-              <a:t>4/20/17</a:t>
+              <a:t>4/24/17</a:t>
             </a:fld>
             <a:endParaRPr lang="en-US"/>
           </a:p>
@@ -3528,7 +3528,12 @@
             <p:ph type="title"/>
           </p:nvPr>
         </p:nvSpPr>
-        <p:spPr/>
+        <p:spPr>
+          <a:xfrm>
+            <a:off x="1445011" y="365125"/>
+            <a:ext cx="9532434" cy="925795"/>
+          </a:xfrm>
+        </p:spPr>
         <p:txBody>
           <a:bodyPr/>
           <a:lstStyle/>
@@ -3566,8 +3571,8 @@
         </p:blipFill>
         <p:spPr>
           <a:xfrm>
-            <a:off x="1438340" y="1825625"/>
-            <a:ext cx="9315319" cy="4351338"/>
+            <a:off x="524107" y="1290920"/>
+            <a:ext cx="11374243" cy="5313095"/>
           </a:xfrm>
         </p:spPr>
       </p:pic>
@@ -3611,7 +3616,12 @@
             <p:ph type="title"/>
           </p:nvPr>
         </p:nvSpPr>
-        <p:spPr/>
+        <p:spPr>
+          <a:xfrm>
+            <a:off x="1389257" y="188542"/>
+            <a:ext cx="9510132" cy="1162592"/>
+          </a:xfrm>
+        </p:spPr>
         <p:txBody>
           <a:bodyPr/>
           <a:lstStyle/>
@@ -3627,7 +3637,7 @@
       </p:sp>
       <p:pic>
         <p:nvPicPr>
-          <p:cNvPr id="7" name="Content Placeholder 6"/>
+          <p:cNvPr id="3" name="Content Placeholder 2"/>
           <p:cNvPicPr>
             <a:picLocks noGrp="1" noChangeAspect="1"/>
           </p:cNvPicPr>
@@ -3649,8 +3659,8 @@
         </p:blipFill>
         <p:spPr>
           <a:xfrm>
-            <a:off x="2045424" y="1519961"/>
-            <a:ext cx="7621090" cy="4763880"/>
+            <a:off x="356840" y="1351134"/>
+            <a:ext cx="11574966" cy="5256429"/>
           </a:xfrm>
         </p:spPr>
       </p:pic>

</xml_diff>